<commit_message>
Made changes to guide
</commit_message>
<xml_diff>
--- a/visual-data-entry-system/Data Entry User Guide.pptx
+++ b/visual-data-entry-system/Data Entry User Guide.pptx
@@ -5355,7 +5355,34 @@
               <a:rPr lang="en-US" dirty="0" smtClean="0">
                 <a:hlinkClick r:id="rId9" action="ppaction://hlinksldjump"/>
               </a:rPr>
-              <a:t>Use Existing Menu</a:t>
+              <a:t>Use </a:t>
+            </a:r>
+            <a:r>
+              <a:rPr lang="en-US" smtClean="0">
+                <a:hlinkClick r:id="rId9" action="ppaction://hlinksldjump"/>
+              </a:rPr>
+              <a:t>Existing Menu</a:t>
+            </a:r>
+            <a:endParaRPr lang="en-US" smtClean="0"/>
+          </a:p>
+          <a:p>
+            <a:r>
+              <a:rPr lang="en-US" smtClean="0">
+                <a:hlinkClick r:id="rId10" action="ppaction://hlinksldjump"/>
+              </a:rPr>
+              <a:t>Use </a:t>
+            </a:r>
+            <a:r>
+              <a:rPr lang="en-US" dirty="0" smtClean="0">
+                <a:hlinkClick r:id="rId10" action="ppaction://hlinksldjump"/>
+              </a:rPr>
+              <a:t>Existing </a:t>
+            </a:r>
+            <a:r>
+              <a:rPr lang="en-US" dirty="0" err="1" smtClean="0">
+                <a:hlinkClick r:id="rId10" action="ppaction://hlinksldjump"/>
+              </a:rPr>
+              <a:t>Endpage</a:t>
             </a:r>
             <a:endParaRPr lang="en-US" dirty="0" smtClean="0"/>
           </a:p>

</xml_diff>

<commit_message>
changed powerpoint and added pdf
</commit_message>
<xml_diff>
--- a/visual-data-entry-system/Data Entry User Guide.pptx
+++ b/visual-data-entry-system/Data Entry User Guide.pptx
@@ -201,7 +201,7 @@
           <a:p>
             <a:fld id="{7B08E2A7-482A-4E0F-9D31-D9A6C7FF47BA}" type="datetimeFigureOut">
               <a:rPr lang="en-US" smtClean="0"/>
-              <a:t>11/30/2011</a:t>
+              <a:t>11/12/02</a:t>
             </a:fld>
             <a:endParaRPr lang="en-US"/>
           </a:p>
@@ -369,6 +369,11 @@
         </p:txBody>
       </p:sp>
     </p:spTree>
+    <p:extLst>
+      <p:ext uri="{BB962C8B-B14F-4D97-AF65-F5344CB8AC3E}">
+        <p14:creationId xmlns:p14="http://schemas.microsoft.com/office/powerpoint/2010/main" val="4039450439"/>
+      </p:ext>
+    </p:extLst>
   </p:cSld>
   <p:clrMap bg1="lt1" tx1="dk1" bg2="lt2" tx2="dk2" accent1="accent1" accent2="accent2" accent3="accent3" accent4="accent4" accent5="accent5" accent6="accent6" hlink="hlink" folHlink="folHlink"/>
   <p:notesStyle>
@@ -1567,7 +1572,7 @@
           <a:p>
             <a:fld id="{E0180C05-A843-4044-8E83-484B8A673CEE}" type="datetimeFigureOut">
               <a:rPr lang="en-US" smtClean="0"/>
-              <a:t>11/30/2011</a:t>
+              <a:t>11/12/02</a:t>
             </a:fld>
             <a:endParaRPr lang="en-US"/>
           </a:p>
@@ -1758,7 +1763,7 @@
           <a:p>
             <a:fld id="{E0180C05-A843-4044-8E83-484B8A673CEE}" type="datetimeFigureOut">
               <a:rPr lang="en-US" smtClean="0"/>
-              <a:t>11/30/2011</a:t>
+              <a:t>11/12/02</a:t>
             </a:fld>
             <a:endParaRPr lang="en-US"/>
           </a:p>
@@ -1943,7 +1948,7 @@
           <a:p>
             <a:fld id="{E0180C05-A843-4044-8E83-484B8A673CEE}" type="datetimeFigureOut">
               <a:rPr lang="en-US" smtClean="0"/>
-              <a:t>11/30/2011</a:t>
+              <a:t>11/12/02</a:t>
             </a:fld>
             <a:endParaRPr lang="en-US"/>
           </a:p>
@@ -2206,7 +2211,7 @@
           <a:p>
             <a:fld id="{E0180C05-A843-4044-8E83-484B8A673CEE}" type="datetimeFigureOut">
               <a:rPr lang="en-US" smtClean="0"/>
-              <a:t>11/30/2011</a:t>
+              <a:t>11/12/02</a:t>
             </a:fld>
             <a:endParaRPr lang="en-US"/>
           </a:p>
@@ -2622,7 +2627,7 @@
           <a:p>
             <a:fld id="{E0180C05-A843-4044-8E83-484B8A673CEE}" type="datetimeFigureOut">
               <a:rPr lang="en-US" smtClean="0"/>
-              <a:t>11/30/2011</a:t>
+              <a:t>11/12/02</a:t>
             </a:fld>
             <a:endParaRPr lang="en-US"/>
           </a:p>
@@ -2864,7 +2869,7 @@
           <a:p>
             <a:fld id="{E0180C05-A843-4044-8E83-484B8A673CEE}" type="datetimeFigureOut">
               <a:rPr lang="en-US" smtClean="0"/>
-              <a:t>11/30/2011</a:t>
+              <a:t>11/12/02</a:t>
             </a:fld>
             <a:endParaRPr lang="en-US"/>
           </a:p>
@@ -3100,7 +3105,7 @@
           <a:p>
             <a:fld id="{E0180C05-A843-4044-8E83-484B8A673CEE}" type="datetimeFigureOut">
               <a:rPr lang="en-US" smtClean="0"/>
-              <a:t>11/30/2011</a:t>
+              <a:t>11/12/02</a:t>
             </a:fld>
             <a:endParaRPr lang="en-US"/>
           </a:p>
@@ -3295,7 +3300,7 @@
           <a:p>
             <a:fld id="{E0180C05-A843-4044-8E83-484B8A673CEE}" type="datetimeFigureOut">
               <a:rPr lang="en-US" smtClean="0"/>
-              <a:t>11/30/2011</a:t>
+              <a:t>11/12/02</a:t>
             </a:fld>
             <a:endParaRPr lang="en-US"/>
           </a:p>
@@ -3393,7 +3398,7 @@
           <a:p>
             <a:fld id="{E0180C05-A843-4044-8E83-484B8A673CEE}" type="datetimeFigureOut">
               <a:rPr lang="en-US" smtClean="0"/>
-              <a:t>11/30/2011</a:t>
+              <a:t>11/12/02</a:t>
             </a:fld>
             <a:endParaRPr lang="en-US"/>
           </a:p>
@@ -3529,7 +3534,7 @@
           <a:p>
             <a:fld id="{E0180C05-A843-4044-8E83-484B8A673CEE}" type="datetimeFigureOut">
               <a:rPr lang="en-US" smtClean="0"/>
-              <a:t>11/30/2011</a:t>
+              <a:t>11/12/02</a:t>
             </a:fld>
             <a:endParaRPr lang="en-US"/>
           </a:p>
@@ -4047,7 +4052,7 @@
           <a:p>
             <a:fld id="{E0180C05-A843-4044-8E83-484B8A673CEE}" type="datetimeFigureOut">
               <a:rPr lang="en-US" smtClean="0"/>
-              <a:t>11/30/2011</a:t>
+              <a:t>11/12/02</a:t>
             </a:fld>
             <a:endParaRPr lang="en-US"/>
           </a:p>
@@ -4308,7 +4313,7 @@
           <a:p>
             <a:fld id="{E0180C05-A843-4044-8E83-484B8A673CEE}" type="datetimeFigureOut">
               <a:rPr lang="en-US" smtClean="0"/>
-              <a:t>11/30/2011</a:t>
+              <a:t>11/12/02</a:t>
             </a:fld>
             <a:endParaRPr lang="en-US"/>
           </a:p>
@@ -4901,7 +4906,7 @@
   <p:timing>
     <p:tnLst>
       <p:par>
-        <p:cTn id="1" dur="indefinite" restart="never" nodeType="tmRoot"/>
+        <p:cTn xmlns:p14="http://schemas.microsoft.com/office/powerpoint/2010/main" id="1" dur="indefinite" restart="never" nodeType="tmRoot"/>
       </p:par>
     </p:tnLst>
   </p:timing>
@@ -4971,7 +4976,7 @@
         </p:blipFill>
         <p:spPr bwMode="auto">
           <a:xfrm>
-            <a:off x="304800" y="1447800"/>
+            <a:off x="304800" y="1600200"/>
             <a:ext cx="5019095" cy="3962400"/>
           </a:xfrm>
           <a:prstGeom prst="rect">
@@ -5103,7 +5108,6 @@
               <a:rPr lang="en-US" dirty="0" smtClean="0"/>
               <a:t>Click on Add Item to this Menu on desired menu level</a:t>
             </a:r>
-            <a:endParaRPr lang="en-US" dirty="0" smtClean="0"/>
           </a:p>
         </p:txBody>
       </p:sp>
@@ -5115,7 +5119,7 @@
         </p:nvSpPr>
         <p:spPr>
           <a:xfrm>
-            <a:off x="5562600" y="5410200"/>
+            <a:off x="5410200" y="5456872"/>
             <a:ext cx="3886200" cy="1477328"/>
           </a:xfrm>
           <a:prstGeom prst="rect">
@@ -5160,7 +5164,6 @@
               <a:rPr lang="en-US" dirty="0" smtClean="0"/>
               <a:t> from dropdown</a:t>
             </a:r>
-            <a:endParaRPr lang="en-US" dirty="0" smtClean="0"/>
           </a:p>
           <a:p>
             <a:r>
@@ -5173,34 +5176,32 @@
       </p:sp>
       <p:pic>
         <p:nvPicPr>
-          <p:cNvPr id="8194" name="Picture 2"/>
+          <p:cNvPr id="3" name="Picture 2" descr="スクリーンショット（2011-12-02 13.46.42）.png"/>
           <p:cNvPicPr>
-            <a:picLocks noChangeAspect="1" noChangeArrowheads="1"/>
+            <a:picLocks noChangeAspect="1"/>
           </p:cNvPicPr>
           <p:nvPr/>
         </p:nvPicPr>
         <p:blipFill>
-          <a:blip r:embed="rId4" cstate="print"/>
-          <a:srcRect l="39824" t="19792" r="34407" b="23958"/>
+          <a:blip r:embed="rId4">
+            <a:extLst>
+              <a:ext uri="{28A0092B-C50C-407E-A947-70E740481C1C}">
+                <a14:useLocalDpi xmlns:a14="http://schemas.microsoft.com/office/drawing/2010/main" val="0"/>
+              </a:ext>
+            </a:extLst>
+          </a:blip>
           <a:stretch>
             <a:fillRect/>
           </a:stretch>
         </p:blipFill>
-        <p:spPr bwMode="auto">
-          <a:xfrm>
-            <a:off x="5486400" y="1295400"/>
-            <a:ext cx="3352800" cy="4114800"/>
+        <p:spPr>
+          <a:xfrm>
+            <a:off x="5486400" y="1600200"/>
+            <a:ext cx="3276600" cy="3969727"/>
           </a:xfrm>
           <a:prstGeom prst="rect">
             <a:avLst/>
           </a:prstGeom>
-          <a:noFill/>
-          <a:ln w="9525">
-            <a:noFill/>
-            <a:miter lim="800000"/>
-            <a:headEnd/>
-            <a:tailEnd/>
-          </a:ln>
         </p:spPr>
       </p:pic>
     </p:spTree>
@@ -5211,7 +5212,7 @@
   <p:timing>
     <p:tnLst>
       <p:par>
-        <p:cTn id="1" dur="indefinite" restart="never" nodeType="tmRoot"/>
+        <p:cTn xmlns:p14="http://schemas.microsoft.com/office/powerpoint/2010/main" id="1" dur="indefinite" restart="never" nodeType="tmRoot"/>
       </p:par>
     </p:tnLst>
   </p:timing>
@@ -5399,7 +5400,7 @@
   <p:timing>
     <p:tnLst>
       <p:par>
-        <p:cTn id="1" dur="indefinite" restart="never" nodeType="tmRoot"/>
+        <p:cTn xmlns:p14="http://schemas.microsoft.com/office/powerpoint/2010/main" id="1" dur="indefinite" restart="never" nodeType="tmRoot"/>
       </p:par>
     </p:tnLst>
   </p:timing>
@@ -5770,7 +5771,7 @@
   <p:timing>
     <p:tnLst>
       <p:par>
-        <p:cTn id="1" dur="indefinite" restart="never" nodeType="tmRoot"/>
+        <p:cTn xmlns:p14="http://schemas.microsoft.com/office/powerpoint/2010/main" id="1" dur="indefinite" restart="never" nodeType="tmRoot"/>
       </p:par>
     </p:tnLst>
   </p:timing>
@@ -5935,7 +5936,7 @@
   <p:timing>
     <p:tnLst>
       <p:par>
-        <p:cTn id="1" dur="indefinite" restart="never" nodeType="tmRoot"/>
+        <p:cTn xmlns:p14="http://schemas.microsoft.com/office/powerpoint/2010/main" id="1" dur="indefinite" restart="never" nodeType="tmRoot"/>
       </p:par>
     </p:tnLst>
   </p:timing>
@@ -6162,7 +6163,7 @@
   <p:timing>
     <p:tnLst>
       <p:par>
-        <p:cTn id="1" dur="indefinite" restart="never" nodeType="tmRoot"/>
+        <p:cTn xmlns:p14="http://schemas.microsoft.com/office/powerpoint/2010/main" id="1" dur="indefinite" restart="never" nodeType="tmRoot"/>
       </p:par>
     </p:tnLst>
   </p:timing>
@@ -6448,6 +6449,13 @@
   <p:clrMapOvr>
     <a:masterClrMapping/>
   </p:clrMapOvr>
+  <p:timing>
+    <p:tnLst>
+      <p:par>
+        <p:cTn xmlns:p14="http://schemas.microsoft.com/office/powerpoint/2010/main" id="1" dur="indefinite" restart="never" nodeType="tmRoot"/>
+      </p:par>
+    </p:tnLst>
+  </p:timing>
 </p:sld>
 </file>
 
@@ -6635,11 +6643,7 @@
           <a:p>
             <a:r>
               <a:rPr lang="en-US" dirty="0" smtClean="0"/>
-              <a:t>(</a:t>
-            </a:r>
-            <a:r>
-              <a:rPr lang="en-US" dirty="0" smtClean="0"/>
-              <a:t>Creates a blank menu to add menu items to)</a:t>
+              <a:t>(Creates a blank menu to add menu items to)</a:t>
             </a:r>
           </a:p>
           <a:p>
@@ -6739,6 +6743,13 @@
   <p:clrMapOvr>
     <a:masterClrMapping/>
   </p:clrMapOvr>
+  <p:timing>
+    <p:tnLst>
+      <p:par>
+        <p:cTn xmlns:p14="http://schemas.microsoft.com/office/powerpoint/2010/main" id="1" dur="indefinite" restart="never" nodeType="tmRoot"/>
+      </p:par>
+    </p:tnLst>
+  </p:timing>
 </p:sld>
 </file>
 
@@ -7049,6 +7060,13 @@
   <p:clrMapOvr>
     <a:masterClrMapping/>
   </p:clrMapOvr>
+  <p:timing>
+    <p:tnLst>
+      <p:par>
+        <p:cTn xmlns:p14="http://schemas.microsoft.com/office/powerpoint/2010/main" id="1" dur="indefinite" restart="never" nodeType="tmRoot"/>
+      </p:par>
+    </p:tnLst>
+  </p:timing>
 </p:sld>
 </file>
 
@@ -7071,6 +7089,53 @@
       </p:grpSpPr>
       <p:sp>
         <p:nvSpPr>
+          <p:cNvPr id="9" name="Rectangle 8"/>
+          <p:cNvSpPr/>
+          <p:nvPr/>
+        </p:nvSpPr>
+        <p:spPr>
+          <a:xfrm>
+            <a:off x="5410200" y="5562600"/>
+            <a:ext cx="3886200" cy="1477328"/>
+          </a:xfrm>
+          <a:prstGeom prst="rect">
+            <a:avLst/>
+          </a:prstGeom>
+        </p:spPr>
+        <p:txBody>
+          <a:bodyPr wrap="square">
+            <a:spAutoFit/>
+          </a:bodyPr>
+          <a:lstStyle/>
+          <a:p>
+            <a:r>
+              <a:rPr lang="en-US" dirty="0" smtClean="0"/>
+              <a:t>Type in Title</a:t>
+            </a:r>
+          </a:p>
+          <a:p>
+            <a:r>
+              <a:rPr lang="en-US" dirty="0" smtClean="0"/>
+              <a:t>Make sure Use Existing Menu is selected</a:t>
+            </a:r>
+          </a:p>
+          <a:p>
+            <a:r>
+              <a:rPr lang="en-US" dirty="0" smtClean="0"/>
+              <a:t>Select a menu item from dropdown</a:t>
+            </a:r>
+          </a:p>
+          <a:p>
+            <a:r>
+              <a:rPr lang="en-US" dirty="0" smtClean="0"/>
+              <a:t>Click Submit</a:t>
+            </a:r>
+            <a:endParaRPr lang="en-US" dirty="0"/>
+          </a:p>
+        </p:txBody>
+      </p:sp>
+      <p:sp>
+        <p:nvSpPr>
           <p:cNvPr id="2" name="Title 1"/>
           <p:cNvSpPr>
             <a:spLocks noGrp="1"/>
@@ -7243,88 +7308,37 @@
               <a:rPr lang="en-US" dirty="0" smtClean="0"/>
               <a:t>Click on Add Item to this Menu on desired menu level</a:t>
             </a:r>
-            <a:endParaRPr lang="en-US" dirty="0" smtClean="0"/>
-          </a:p>
-        </p:txBody>
-      </p:sp>
-      <p:sp>
-        <p:nvSpPr>
-          <p:cNvPr id="9" name="Rectangle 8"/>
-          <p:cNvSpPr/>
-          <p:nvPr/>
-        </p:nvSpPr>
-        <p:spPr>
-          <a:xfrm>
-            <a:off x="5562600" y="5410200"/>
-            <a:ext cx="3886200" cy="1477328"/>
-          </a:xfrm>
-          <a:prstGeom prst="rect">
-            <a:avLst/>
-          </a:prstGeom>
-        </p:spPr>
-        <p:txBody>
-          <a:bodyPr wrap="square">
-            <a:spAutoFit/>
-          </a:bodyPr>
-          <a:lstStyle/>
-          <a:p>
-            <a:r>
-              <a:rPr lang="en-US" dirty="0" smtClean="0"/>
-              <a:t>Type in Title</a:t>
-            </a:r>
-          </a:p>
-          <a:p>
-            <a:r>
-              <a:rPr lang="en-US" dirty="0" smtClean="0"/>
-              <a:t>Make sure Use Existing Menu is selected</a:t>
-            </a:r>
-          </a:p>
-          <a:p>
-            <a:r>
-              <a:rPr lang="en-US" dirty="0" smtClean="0"/>
-              <a:t>Select a menu item from dropdown</a:t>
-            </a:r>
-            <a:endParaRPr lang="en-US" dirty="0" smtClean="0"/>
-          </a:p>
-          <a:p>
-            <a:r>
-              <a:rPr lang="en-US" dirty="0" smtClean="0"/>
-              <a:t>Click Submit</a:t>
-            </a:r>
-            <a:endParaRPr lang="en-US" dirty="0"/>
           </a:p>
         </p:txBody>
       </p:sp>
       <p:pic>
         <p:nvPicPr>
-          <p:cNvPr id="7170" name="Picture 2"/>
+          <p:cNvPr id="5" name="Picture 4" descr="スクリーンショット（2011-12-02 13.47.50）.png"/>
           <p:cNvPicPr>
-            <a:picLocks noChangeAspect="1" noChangeArrowheads="1"/>
+            <a:picLocks noChangeAspect="1"/>
           </p:cNvPicPr>
           <p:nvPr/>
         </p:nvPicPr>
         <p:blipFill>
-          <a:blip r:embed="rId4" cstate="print"/>
-          <a:srcRect l="40996" t="22917" r="34407" b="31250"/>
+          <a:blip r:embed="rId4">
+            <a:extLst>
+              <a:ext uri="{28A0092B-C50C-407E-A947-70E740481C1C}">
+                <a14:useLocalDpi xmlns:a14="http://schemas.microsoft.com/office/drawing/2010/main" val="0"/>
+              </a:ext>
+            </a:extLst>
+          </a:blip>
           <a:stretch>
             <a:fillRect/>
           </a:stretch>
         </p:blipFill>
-        <p:spPr bwMode="auto">
-          <a:xfrm>
-            <a:off x="5486400" y="1905000"/>
-            <a:ext cx="3200400" cy="3352800"/>
+        <p:spPr>
+          <a:xfrm>
+            <a:off x="5486400" y="1600200"/>
+            <a:ext cx="3276600" cy="3993027"/>
           </a:xfrm>
           <a:prstGeom prst="rect">
             <a:avLst/>
           </a:prstGeom>
-          <a:noFill/>
-          <a:ln w="9525">
-            <a:noFill/>
-            <a:miter lim="800000"/>
-            <a:headEnd/>
-            <a:tailEnd/>
-          </a:ln>
         </p:spPr>
       </p:pic>
     </p:spTree>
@@ -7335,7 +7349,7 @@
   <p:timing>
     <p:tnLst>
       <p:par>
-        <p:cTn id="1" dur="indefinite" restart="never" nodeType="tmRoot"/>
+        <p:cTn xmlns:p14="http://schemas.microsoft.com/office/powerpoint/2010/main" id="1" dur="indefinite" restart="never" nodeType="tmRoot"/>
       </p:par>
     </p:tnLst>
   </p:timing>

</xml_diff>